<commit_message>
Update & Add new ppts
</commit_message>
<xml_diff>
--- a/一顆謙卑的心.pptx
+++ b/一顆謙卑的心.pptx
@@ -5,10 +5,13 @@
     <p:sldMasterId id="2147483689" r:id="rId1"/>
   </p:sldMasterIdLst>
   <p:sldIdLst>
-    <p:sldId id="256" r:id="rId2"/>
-    <p:sldId id="257" r:id="rId3"/>
+    <p:sldId id="258" r:id="rId2"/>
+    <p:sldId id="259" r:id="rId3"/>
+    <p:sldId id="260" r:id="rId4"/>
+    <p:sldId id="261" r:id="rId5"/>
+    <p:sldId id="262" r:id="rId6"/>
   </p:sldIdLst>
-  <p:sldSz cx="9144000" cy="6858000" type="screen4x3"/>
+  <p:sldSz cx="12192000" cy="6858000"/>
   <p:notesSz cx="6858000" cy="9144000"/>
   <p:defaultTextStyle>
     <a:defPPr>
@@ -105,6 +108,22 @@
       </a:defRPr>
     </a:lvl9pPr>
   </p:defaultTextStyle>
+  <p:extLst>
+    <p:ext uri="{EFAFB233-063F-42B5-8137-9DF3F51BA10A}">
+      <p15:sldGuideLst xmlns:p15="http://schemas.microsoft.com/office/powerpoint/2012/main">
+        <p15:guide id="1" orient="horz" pos="2160" userDrawn="1">
+          <p15:clr>
+            <a:srgbClr val="A4A3A4"/>
+          </p15:clr>
+        </p15:guide>
+        <p15:guide id="2" pos="3840" userDrawn="1">
+          <p15:clr>
+            <a:srgbClr val="A4A3A4"/>
+          </p15:clr>
+        </p15:guide>
+      </p15:sldGuideLst>
+    </p:ext>
+  </p:extLst>
 </p:presentation>
 </file>
 
@@ -137,8 +156,8 @@
         </p:nvSpPr>
         <p:spPr>
           <a:xfrm>
-            <a:off x="685800" y="2130425"/>
-            <a:ext cx="7772400" cy="1470025"/>
+            <a:off x="914400" y="2130426"/>
+            <a:ext cx="10363200" cy="1470025"/>
           </a:xfrm>
         </p:spPr>
         <p:txBody>
@@ -165,8 +184,8 @@
         </p:nvSpPr>
         <p:spPr>
           <a:xfrm>
-            <a:off x="1371600" y="3886200"/>
-            <a:ext cx="6400800" cy="1752600"/>
+            <a:off x="1828800" y="3886200"/>
+            <a:ext cx="8534400" cy="1752600"/>
           </a:xfrm>
         </p:spPr>
         <p:txBody>
@@ -290,7 +309,7 @@
             <a:fld id="{6749CD7E-C707-4067-A4FF-240A3A33EC32}" type="datetimeFigureOut">
               <a:rPr lang="zh-TW" altLang="en-US" smtClean="0"/>
               <a:pPr/>
-              <a:t>2018/1/27</a:t>
+              <a:t>2023/8/26</a:t>
             </a:fld>
             <a:endParaRPr lang="zh-TW" altLang="en-US"/>
           </a:p>
@@ -457,7 +476,7 @@
             <a:fld id="{6749CD7E-C707-4067-A4FF-240A3A33EC32}" type="datetimeFigureOut">
               <a:rPr lang="zh-TW" altLang="en-US" smtClean="0"/>
               <a:pPr/>
-              <a:t>2018/1/27</a:t>
+              <a:t>2023/8/26</a:t>
             </a:fld>
             <a:endParaRPr lang="zh-TW" altLang="en-US"/>
           </a:p>
@@ -543,8 +562,8 @@
         </p:nvSpPr>
         <p:spPr>
           <a:xfrm>
-            <a:off x="6629400" y="274638"/>
-            <a:ext cx="2057400" cy="5851525"/>
+            <a:off x="8839200" y="274639"/>
+            <a:ext cx="2743200" cy="5851525"/>
           </a:xfrm>
         </p:spPr>
         <p:txBody>
@@ -571,8 +590,8 @@
         </p:nvSpPr>
         <p:spPr>
           <a:xfrm>
-            <a:off x="457200" y="274638"/>
-            <a:ext cx="6019800" cy="5851525"/>
+            <a:off x="609600" y="274639"/>
+            <a:ext cx="8026400" cy="5851525"/>
           </a:xfrm>
         </p:spPr>
         <p:txBody>
@@ -634,7 +653,7 @@
             <a:fld id="{6749CD7E-C707-4067-A4FF-240A3A33EC32}" type="datetimeFigureOut">
               <a:rPr lang="zh-TW" altLang="en-US" smtClean="0"/>
               <a:pPr/>
-              <a:t>2018/1/27</a:t>
+              <a:t>2023/8/26</a:t>
             </a:fld>
             <a:endParaRPr lang="zh-TW" altLang="en-US"/>
           </a:p>
@@ -801,7 +820,7 @@
             <a:fld id="{6749CD7E-C707-4067-A4FF-240A3A33EC32}" type="datetimeFigureOut">
               <a:rPr lang="zh-TW" altLang="en-US" smtClean="0"/>
               <a:pPr/>
-              <a:t>2018/1/27</a:t>
+              <a:t>2023/8/26</a:t>
             </a:fld>
             <a:endParaRPr lang="zh-TW" altLang="en-US"/>
           </a:p>
@@ -887,8 +906,8 @@
         </p:nvSpPr>
         <p:spPr>
           <a:xfrm>
-            <a:off x="722313" y="4406900"/>
-            <a:ext cx="7772400" cy="1362075"/>
+            <a:off x="963084" y="4406901"/>
+            <a:ext cx="10363200" cy="1362075"/>
           </a:xfrm>
         </p:spPr>
         <p:txBody>
@@ -919,8 +938,8 @@
         </p:nvSpPr>
         <p:spPr>
           <a:xfrm>
-            <a:off x="722313" y="2906713"/>
-            <a:ext cx="7772400" cy="1500187"/>
+            <a:off x="963084" y="2906713"/>
+            <a:ext cx="10363200" cy="1500187"/>
           </a:xfrm>
         </p:spPr>
         <p:txBody>
@@ -1044,7 +1063,7 @@
             <a:fld id="{6749CD7E-C707-4067-A4FF-240A3A33EC32}" type="datetimeFigureOut">
               <a:rPr lang="zh-TW" altLang="en-US" smtClean="0"/>
               <a:pPr/>
-              <a:t>2018/1/27</a:t>
+              <a:t>2023/8/26</a:t>
             </a:fld>
             <a:endParaRPr lang="zh-TW" altLang="en-US"/>
           </a:p>
@@ -1153,8 +1172,8 @@
         </p:nvSpPr>
         <p:spPr>
           <a:xfrm>
-            <a:off x="457200" y="1600200"/>
-            <a:ext cx="4038600" cy="4525963"/>
+            <a:off x="609600" y="1600201"/>
+            <a:ext cx="5384800" cy="4525963"/>
           </a:xfrm>
         </p:spPr>
         <p:txBody>
@@ -1238,8 +1257,8 @@
         </p:nvSpPr>
         <p:spPr>
           <a:xfrm>
-            <a:off x="4648200" y="1600200"/>
-            <a:ext cx="4038600" cy="4525963"/>
+            <a:off x="6197600" y="1600201"/>
+            <a:ext cx="5384800" cy="4525963"/>
           </a:xfrm>
         </p:spPr>
         <p:txBody>
@@ -1329,7 +1348,7 @@
             <a:fld id="{6749CD7E-C707-4067-A4FF-240A3A33EC32}" type="datetimeFigureOut">
               <a:rPr lang="zh-TW" altLang="en-US" smtClean="0"/>
               <a:pPr/>
-              <a:t>2018/1/27</a:t>
+              <a:t>2023/8/26</a:t>
             </a:fld>
             <a:endParaRPr lang="zh-TW" altLang="en-US"/>
           </a:p>
@@ -1442,8 +1461,8 @@
         </p:nvSpPr>
         <p:spPr>
           <a:xfrm>
-            <a:off x="457200" y="1535113"/>
-            <a:ext cx="4040188" cy="639762"/>
+            <a:off x="609600" y="1535113"/>
+            <a:ext cx="5386917" cy="639762"/>
           </a:xfrm>
         </p:spPr>
         <p:txBody>
@@ -1507,8 +1526,8 @@
         </p:nvSpPr>
         <p:spPr>
           <a:xfrm>
-            <a:off x="457200" y="2174875"/>
-            <a:ext cx="4040188" cy="3951288"/>
+            <a:off x="609600" y="2174875"/>
+            <a:ext cx="5386917" cy="3951288"/>
           </a:xfrm>
         </p:spPr>
         <p:txBody>
@@ -1592,8 +1611,8 @@
         </p:nvSpPr>
         <p:spPr>
           <a:xfrm>
-            <a:off x="4645025" y="1535113"/>
-            <a:ext cx="4041775" cy="639762"/>
+            <a:off x="6193368" y="1535113"/>
+            <a:ext cx="5389033" cy="639762"/>
           </a:xfrm>
         </p:spPr>
         <p:txBody>
@@ -1657,8 +1676,8 @@
         </p:nvSpPr>
         <p:spPr>
           <a:xfrm>
-            <a:off x="4645025" y="2174875"/>
-            <a:ext cx="4041775" cy="3951288"/>
+            <a:off x="6193368" y="2174875"/>
+            <a:ext cx="5389033" cy="3951288"/>
           </a:xfrm>
         </p:spPr>
         <p:txBody>
@@ -1748,7 +1767,7 @@
             <a:fld id="{6749CD7E-C707-4067-A4FF-240A3A33EC32}" type="datetimeFigureOut">
               <a:rPr lang="zh-TW" altLang="en-US" smtClean="0"/>
               <a:pPr/>
-              <a:t>2018/1/27</a:t>
+              <a:t>2023/8/26</a:t>
             </a:fld>
             <a:endParaRPr lang="zh-TW" altLang="en-US"/>
           </a:p>
@@ -1863,7 +1882,7 @@
             <a:fld id="{6749CD7E-C707-4067-A4FF-240A3A33EC32}" type="datetimeFigureOut">
               <a:rPr lang="zh-TW" altLang="en-US" smtClean="0"/>
               <a:pPr/>
-              <a:t>2018/1/27</a:t>
+              <a:t>2023/8/26</a:t>
             </a:fld>
             <a:endParaRPr lang="zh-TW" altLang="en-US"/>
           </a:p>
@@ -1955,7 +1974,7 @@
             <a:fld id="{6749CD7E-C707-4067-A4FF-240A3A33EC32}" type="datetimeFigureOut">
               <a:rPr lang="zh-TW" altLang="en-US" smtClean="0"/>
               <a:pPr/>
-              <a:t>2018/1/27</a:t>
+              <a:t>2023/8/26</a:t>
             </a:fld>
             <a:endParaRPr lang="zh-TW" altLang="en-US"/>
           </a:p>
@@ -2041,8 +2060,8 @@
         </p:nvSpPr>
         <p:spPr>
           <a:xfrm>
-            <a:off x="457200" y="273050"/>
-            <a:ext cx="3008313" cy="1162050"/>
+            <a:off x="609601" y="273050"/>
+            <a:ext cx="4011084" cy="1162050"/>
           </a:xfrm>
         </p:spPr>
         <p:txBody>
@@ -2073,8 +2092,8 @@
         </p:nvSpPr>
         <p:spPr>
           <a:xfrm>
-            <a:off x="3575050" y="273050"/>
-            <a:ext cx="5111750" cy="5853113"/>
+            <a:off x="4766733" y="273051"/>
+            <a:ext cx="6815667" cy="5853113"/>
           </a:xfrm>
         </p:spPr>
         <p:txBody>
@@ -2158,8 +2177,8 @@
         </p:nvSpPr>
         <p:spPr>
           <a:xfrm>
-            <a:off x="457200" y="1435100"/>
-            <a:ext cx="3008313" cy="4691063"/>
+            <a:off x="609601" y="1435101"/>
+            <a:ext cx="4011084" cy="4691063"/>
           </a:xfrm>
         </p:spPr>
         <p:txBody>
@@ -2229,7 +2248,7 @@
             <a:fld id="{6749CD7E-C707-4067-A4FF-240A3A33EC32}" type="datetimeFigureOut">
               <a:rPr lang="zh-TW" altLang="en-US" smtClean="0"/>
               <a:pPr/>
-              <a:t>2018/1/27</a:t>
+              <a:t>2023/8/26</a:t>
             </a:fld>
             <a:endParaRPr lang="zh-TW" altLang="en-US"/>
           </a:p>
@@ -2315,8 +2334,8 @@
         </p:nvSpPr>
         <p:spPr>
           <a:xfrm>
-            <a:off x="1792288" y="4800600"/>
-            <a:ext cx="5486400" cy="566738"/>
+            <a:off x="2389717" y="4800600"/>
+            <a:ext cx="7315200" cy="566738"/>
           </a:xfrm>
         </p:spPr>
         <p:txBody>
@@ -2347,8 +2366,8 @@
         </p:nvSpPr>
         <p:spPr>
           <a:xfrm>
-            <a:off x="1792288" y="612775"/>
-            <a:ext cx="5486400" cy="4114800"/>
+            <a:off x="2389717" y="612775"/>
+            <a:ext cx="7315200" cy="4114800"/>
           </a:xfrm>
         </p:spPr>
         <p:txBody>
@@ -2412,8 +2431,8 @@
         </p:nvSpPr>
         <p:spPr>
           <a:xfrm>
-            <a:off x="1792288" y="5367338"/>
-            <a:ext cx="5486400" cy="804862"/>
+            <a:off x="2389717" y="5367338"/>
+            <a:ext cx="7315200" cy="804862"/>
           </a:xfrm>
         </p:spPr>
         <p:txBody>
@@ -2483,7 +2502,7 @@
             <a:fld id="{6749CD7E-C707-4067-A4FF-240A3A33EC32}" type="datetimeFigureOut">
               <a:rPr lang="zh-TW" altLang="en-US" smtClean="0"/>
               <a:pPr/>
-              <a:t>2018/1/27</a:t>
+              <a:t>2023/8/26</a:t>
             </a:fld>
             <a:endParaRPr lang="zh-TW" altLang="en-US"/>
           </a:p>
@@ -2579,8 +2598,8 @@
         </p:nvSpPr>
         <p:spPr>
           <a:xfrm>
-            <a:off x="457200" y="274638"/>
-            <a:ext cx="8229600" cy="1143000"/>
+            <a:off x="609600" y="274638"/>
+            <a:ext cx="10972800" cy="1143000"/>
           </a:xfrm>
           <a:prstGeom prst="rect">
             <a:avLst/>
@@ -2612,8 +2631,8 @@
         </p:nvSpPr>
         <p:spPr>
           <a:xfrm>
-            <a:off x="457200" y="1600200"/>
-            <a:ext cx="8229600" cy="4525963"/>
+            <a:off x="609600" y="1600201"/>
+            <a:ext cx="10972800" cy="4525963"/>
           </a:xfrm>
           <a:prstGeom prst="rect">
             <a:avLst/>
@@ -2674,8 +2693,8 @@
         </p:nvSpPr>
         <p:spPr>
           <a:xfrm>
-            <a:off x="457200" y="6356350"/>
-            <a:ext cx="2133600" cy="365125"/>
+            <a:off x="609600" y="6356351"/>
+            <a:ext cx="2844800" cy="365125"/>
           </a:xfrm>
           <a:prstGeom prst="rect">
             <a:avLst/>
@@ -2698,7 +2717,7 @@
             <a:fld id="{6749CD7E-C707-4067-A4FF-240A3A33EC32}" type="datetimeFigureOut">
               <a:rPr lang="zh-TW" altLang="en-US" smtClean="0"/>
               <a:pPr/>
-              <a:t>2018/1/27</a:t>
+              <a:t>2023/8/26</a:t>
             </a:fld>
             <a:endParaRPr lang="zh-TW" altLang="en-US"/>
           </a:p>
@@ -2716,8 +2735,8 @@
         </p:nvSpPr>
         <p:spPr>
           <a:xfrm>
-            <a:off x="3124200" y="6356350"/>
-            <a:ext cx="2895600" cy="365125"/>
+            <a:off x="4165600" y="6356351"/>
+            <a:ext cx="3860800" cy="365125"/>
           </a:xfrm>
           <a:prstGeom prst="rect">
             <a:avLst/>
@@ -2753,8 +2772,8 @@
         </p:nvSpPr>
         <p:spPr>
           <a:xfrm>
-            <a:off x="6553200" y="6356350"/>
-            <a:ext cx="2133600" cy="365125"/>
+            <a:off x="8737600" y="6356351"/>
+            <a:ext cx="2844800" cy="365125"/>
           </a:xfrm>
           <a:prstGeom prst="rect">
             <a:avLst/>
@@ -3079,213 +3098,61 @@
             <p:ph type="title"/>
           </p:nvPr>
         </p:nvSpPr>
-        <p:spPr/>
-        <p:txBody>
-          <a:bodyPr/>
-          <a:lstStyle/>
-          <a:p>
-            <a:r>
-              <a:rPr lang="zh-TW" altLang="en-US" b="1" dirty="0" smtClean="0">
+        <p:spPr>
+          <a:xfrm>
+            <a:off x="0" y="2660915"/>
+            <a:ext cx="12192000" cy="1143000"/>
+          </a:xfrm>
+        </p:spPr>
+        <p:txBody>
+          <a:bodyPr>
+            <a:noAutofit/>
+          </a:bodyPr>
+          <a:lstStyle/>
+          <a:p>
+            <a:r>
+              <a:rPr lang="zh-TW" altLang="en-US" sz="7200" b="1" i="1" dirty="0">
                 <a:solidFill>
                   <a:srgbClr val="000066"/>
                 </a:solidFill>
+                <a:effectLst>
+                  <a:outerShdw blurRad="38100" dist="38100" dir="2700000" algn="tl">
+                    <a:srgbClr val="000000">
+                      <a:alpha val="43137"/>
+                    </a:srgbClr>
+                  </a:outerShdw>
+                </a:effectLst>
                 <a:latin typeface="微軟正黑體" pitchFamily="34" charset="-120"/>
                 <a:ea typeface="微軟正黑體" pitchFamily="34" charset="-120"/>
               </a:rPr>
-              <a:t>一顆謙卑的心</a:t>
-            </a:r>
-            <a:endParaRPr lang="zh-TW" altLang="en-US" b="1" dirty="0">
-              <a:solidFill>
-                <a:srgbClr val="000066"/>
-              </a:solidFill>
-              <a:latin typeface="微軟正黑體" pitchFamily="34" charset="-120"/>
-              <a:ea typeface="微軟正黑體" pitchFamily="34" charset="-120"/>
-            </a:endParaRPr>
-          </a:p>
-        </p:txBody>
-      </p:sp>
-      <p:sp>
-        <p:nvSpPr>
-          <p:cNvPr id="5" name="內容版面配置區 4"/>
-          <p:cNvSpPr>
-            <a:spLocks noGrp="1"/>
-          </p:cNvSpPr>
-          <p:nvPr>
-            <p:ph idx="1"/>
-          </p:nvPr>
-        </p:nvSpPr>
-        <p:spPr>
-          <a:xfrm>
-            <a:off x="0" y="1600200"/>
-            <a:ext cx="9144000" cy="5257800"/>
-          </a:xfrm>
-        </p:spPr>
-        <p:txBody>
-          <a:bodyPr>
-            <a:normAutofit/>
-          </a:bodyPr>
-          <a:lstStyle/>
-          <a:p>
-            <a:pPr algn="ctr">
-              <a:buNone/>
-            </a:pPr>
-            <a:r>
-              <a:rPr lang="zh-TW" altLang="en-US" sz="5400" b="1" dirty="0">
+              <a:t>一</a:t>
+            </a:r>
+            <a:r>
+              <a:rPr lang="zh-TW" altLang="en-US" sz="7200" b="1" i="1" dirty="0">
                 <a:solidFill>
                   <a:srgbClr val="000066"/>
                 </a:solidFill>
+                <a:effectLst>
+                  <a:outerShdw blurRad="38100" dist="38100" dir="2700000" algn="tl">
+                    <a:srgbClr val="000000">
+                      <a:alpha val="43137"/>
+                    </a:srgbClr>
+                  </a:outerShdw>
+                </a:effectLst>
                 <a:latin typeface="微軟正黑體" pitchFamily="34" charset="-120"/>
                 <a:ea typeface="微軟正黑體" pitchFamily="34" charset="-120"/>
               </a:rPr>
-              <a:t>求你給我一顆謙卑的</a:t>
-            </a:r>
-            <a:r>
-              <a:rPr lang="zh-TW" altLang="en-US" sz="5400" b="1" dirty="0" smtClean="0">
-                <a:solidFill>
-                  <a:srgbClr val="000066"/>
-                </a:solidFill>
-                <a:latin typeface="微軟正黑體" pitchFamily="34" charset="-120"/>
-                <a:ea typeface="微軟正黑體" pitchFamily="34" charset="-120"/>
-              </a:rPr>
-              <a:t>心</a:t>
-            </a:r>
-            <a:endParaRPr lang="en-US" altLang="zh-TW" sz="5400" b="1" dirty="0" smtClean="0">
-              <a:solidFill>
-                <a:srgbClr val="000066"/>
-              </a:solidFill>
-              <a:latin typeface="微軟正黑體" pitchFamily="34" charset="-120"/>
-              <a:ea typeface="微軟正黑體" pitchFamily="34" charset="-120"/>
-            </a:endParaRPr>
-          </a:p>
-          <a:p>
-            <a:pPr algn="ctr">
-              <a:buNone/>
-            </a:pPr>
-            <a:r>
-              <a:rPr lang="zh-TW" altLang="en-US" sz="5400" b="1" dirty="0" smtClean="0">
-                <a:solidFill>
-                  <a:srgbClr val="000066"/>
-                </a:solidFill>
-                <a:latin typeface="微軟正黑體" pitchFamily="34" charset="-120"/>
-                <a:ea typeface="微軟正黑體" pitchFamily="34" charset="-120"/>
-              </a:rPr>
-              <a:t>給</a:t>
-            </a:r>
-            <a:r>
-              <a:rPr lang="zh-TW" altLang="en-US" sz="5400" b="1" dirty="0">
-                <a:solidFill>
-                  <a:srgbClr val="000066"/>
-                </a:solidFill>
-                <a:latin typeface="微軟正黑體" pitchFamily="34" charset="-120"/>
-                <a:ea typeface="微軟正黑體" pitchFamily="34" charset="-120"/>
-              </a:rPr>
-              <a:t>我一顆受教的</a:t>
-            </a:r>
-            <a:r>
-              <a:rPr lang="zh-TW" altLang="en-US" sz="5400" b="1" dirty="0" smtClean="0">
-                <a:solidFill>
-                  <a:srgbClr val="000066"/>
-                </a:solidFill>
-                <a:latin typeface="微軟正黑體" pitchFamily="34" charset="-120"/>
-                <a:ea typeface="微軟正黑體" pitchFamily="34" charset="-120"/>
-              </a:rPr>
-              <a:t>靈</a:t>
-            </a:r>
-            <a:endParaRPr lang="en-US" altLang="zh-TW" sz="5400" b="1" dirty="0">
-              <a:solidFill>
-                <a:srgbClr val="000066"/>
-              </a:solidFill>
-              <a:latin typeface="微軟正黑體" pitchFamily="34" charset="-120"/>
-              <a:ea typeface="微軟正黑體" pitchFamily="34" charset="-120"/>
-            </a:endParaRPr>
-          </a:p>
-          <a:p>
-            <a:pPr algn="ctr">
-              <a:buNone/>
-            </a:pPr>
-            <a:r>
-              <a:rPr lang="zh-TW" altLang="en-US" sz="5400" b="1" dirty="0" smtClean="0">
-                <a:solidFill>
-                  <a:srgbClr val="000066"/>
-                </a:solidFill>
-                <a:latin typeface="微軟正黑體" pitchFamily="34" charset="-120"/>
-                <a:ea typeface="微軟正黑體" pitchFamily="34" charset="-120"/>
-              </a:rPr>
-              <a:t>好</a:t>
-            </a:r>
-            <a:r>
-              <a:rPr lang="zh-TW" altLang="en-US" sz="5400" b="1" dirty="0">
-                <a:solidFill>
-                  <a:srgbClr val="000066"/>
-                </a:solidFill>
-                <a:latin typeface="微軟正黑體" pitchFamily="34" charset="-120"/>
-                <a:ea typeface="微軟正黑體" pitchFamily="34" charset="-120"/>
-              </a:rPr>
-              <a:t>讓我能走在你的旨意</a:t>
-            </a:r>
-            <a:r>
-              <a:rPr lang="zh-TW" altLang="en-US" sz="5400" b="1" dirty="0" smtClean="0">
-                <a:solidFill>
-                  <a:srgbClr val="000066"/>
-                </a:solidFill>
-                <a:latin typeface="微軟正黑體" pitchFamily="34" charset="-120"/>
-                <a:ea typeface="微軟正黑體" pitchFamily="34" charset="-120"/>
-              </a:rPr>
-              <a:t>裡</a:t>
-            </a:r>
-            <a:endParaRPr lang="en-US" altLang="zh-TW" sz="5400" b="1" dirty="0" smtClean="0">
-              <a:solidFill>
-                <a:srgbClr val="000066"/>
-              </a:solidFill>
-              <a:latin typeface="微軟正黑體" pitchFamily="34" charset="-120"/>
-              <a:ea typeface="微軟正黑體" pitchFamily="34" charset="-120"/>
-            </a:endParaRPr>
-          </a:p>
-          <a:p>
-            <a:pPr algn="ctr">
-              <a:buNone/>
-            </a:pPr>
-            <a:r>
-              <a:rPr lang="zh-TW" altLang="en-US" sz="5400" b="1" dirty="0" smtClean="0">
-                <a:solidFill>
-                  <a:srgbClr val="000066"/>
-                </a:solidFill>
-                <a:latin typeface="微軟正黑體" pitchFamily="34" charset="-120"/>
-                <a:ea typeface="微軟正黑體" pitchFamily="34" charset="-120"/>
-              </a:rPr>
-              <a:t>如同</a:t>
-            </a:r>
-            <a:r>
-              <a:rPr lang="zh-TW" altLang="en-US" sz="5400" b="1" dirty="0">
-                <a:solidFill>
-                  <a:srgbClr val="000066"/>
-                </a:solidFill>
-                <a:latin typeface="微軟正黑體" pitchFamily="34" charset="-120"/>
-                <a:ea typeface="微軟正黑體" pitchFamily="34" charset="-120"/>
-              </a:rPr>
-              <a:t>耶穌的</a:t>
-            </a:r>
-            <a:r>
-              <a:rPr lang="zh-TW" altLang="en-US" sz="5400" b="1" dirty="0" smtClean="0">
-                <a:solidFill>
-                  <a:srgbClr val="000066"/>
-                </a:solidFill>
-                <a:latin typeface="微軟正黑體" pitchFamily="34" charset="-120"/>
-                <a:ea typeface="微軟正黑體" pitchFamily="34" charset="-120"/>
-              </a:rPr>
-              <a:t>生命</a:t>
-            </a:r>
-            <a:endParaRPr lang="zh-TW" altLang="en-US" sz="5400" b="1" dirty="0">
-              <a:solidFill>
-                <a:srgbClr val="000066"/>
-              </a:solidFill>
-              <a:latin typeface="微軟正黑體" pitchFamily="34" charset="-120"/>
-              <a:ea typeface="微軟正黑體" pitchFamily="34" charset="-120"/>
-            </a:endParaRPr>
+              <a:t>顆謙卑的心</a:t>
+            </a:r>
           </a:p>
         </p:txBody>
       </p:sp>
     </p:spTree>
+    <p:extLst>
+      <p:ext uri="{BB962C8B-B14F-4D97-AF65-F5344CB8AC3E}">
+        <p14:creationId xmlns:p14="http://schemas.microsoft.com/office/powerpoint/2010/main" val="2549589436"/>
+      </p:ext>
+    </p:extLst>
   </p:cSld>
   <p:clrMapOvr>
     <a:masterClrMapping/>
@@ -3312,30 +3179,40 @@
       </p:grpSpPr>
       <p:sp>
         <p:nvSpPr>
-          <p:cNvPr id="4" name="標題 3"/>
-          <p:cNvSpPr>
-            <a:spLocks noGrp="1"/>
-          </p:cNvSpPr>
-          <p:nvPr>
-            <p:ph type="title"/>
-          </p:nvPr>
-        </p:nvSpPr>
-        <p:spPr/>
-        <p:txBody>
-          <a:bodyPr/>
-          <a:lstStyle/>
-          <a:p>
-            <a:r>
-              <a:rPr lang="zh-TW" altLang="en-US" b="1" dirty="0" smtClean="0">
+          <p:cNvPr id="5" name="內容版面配置區 4"/>
+          <p:cNvSpPr>
+            <a:spLocks noGrp="1"/>
+          </p:cNvSpPr>
+          <p:nvPr>
+            <p:ph idx="1"/>
+          </p:nvPr>
+        </p:nvSpPr>
+        <p:spPr>
+          <a:xfrm>
+            <a:off x="0" y="2084851"/>
+            <a:ext cx="12192000" cy="2404863"/>
+          </a:xfrm>
+        </p:spPr>
+        <p:txBody>
+          <a:bodyPr anchor="ctr">
+            <a:normAutofit/>
+          </a:bodyPr>
+          <a:lstStyle/>
+          <a:p>
+            <a:pPr algn="ctr">
+              <a:buNone/>
+            </a:pPr>
+            <a:r>
+              <a:rPr lang="zh-TW" altLang="en-US" sz="6400" b="1" dirty="0">
                 <a:solidFill>
                   <a:srgbClr val="000066"/>
                 </a:solidFill>
                 <a:latin typeface="微軟正黑體" pitchFamily="34" charset="-120"/>
                 <a:ea typeface="微軟正黑體" pitchFamily="34" charset="-120"/>
               </a:rPr>
-              <a:t>一顆謙卑的心</a:t>
-            </a:r>
-            <a:endParaRPr lang="zh-TW" altLang="en-US" b="1" dirty="0">
+              <a:t>求祢給我一顆謙卑的心</a:t>
+            </a:r>
+            <a:endParaRPr lang="en-US" altLang="zh-TW" sz="6400" b="1" dirty="0">
               <a:solidFill>
                 <a:srgbClr val="000066"/>
               </a:solidFill>
@@ -3343,44 +3220,21 @@
               <a:ea typeface="微軟正黑體" pitchFamily="34" charset="-120"/>
             </a:endParaRPr>
           </a:p>
-        </p:txBody>
-      </p:sp>
-      <p:sp>
-        <p:nvSpPr>
-          <p:cNvPr id="5" name="內容版面配置區 4"/>
-          <p:cNvSpPr>
-            <a:spLocks noGrp="1"/>
-          </p:cNvSpPr>
-          <p:nvPr>
-            <p:ph idx="1"/>
-          </p:nvPr>
-        </p:nvSpPr>
-        <p:spPr>
-          <a:xfrm>
-            <a:off x="0" y="1600200"/>
-            <a:ext cx="9144000" cy="5257800"/>
-          </a:xfrm>
-        </p:spPr>
-        <p:txBody>
-          <a:bodyPr>
-            <a:normAutofit/>
-          </a:bodyPr>
-          <a:lstStyle/>
           <a:p>
             <a:pPr algn="ctr">
               <a:buNone/>
             </a:pPr>
             <a:r>
-              <a:rPr lang="zh-TW" altLang="en-US" sz="5400" b="1" dirty="0" smtClean="0">
+              <a:rPr lang="zh-TW" altLang="en-US" sz="6400" b="1" dirty="0">
                 <a:solidFill>
                   <a:srgbClr val="000066"/>
                 </a:solidFill>
                 <a:latin typeface="微軟正黑體" pitchFamily="34" charset="-120"/>
                 <a:ea typeface="微軟正黑體" pitchFamily="34" charset="-120"/>
               </a:rPr>
-              <a:t>幫助我更多的禱告</a:t>
-            </a:r>
-            <a:endParaRPr lang="en-US" altLang="zh-TW" sz="5400" b="1" dirty="0" smtClean="0">
+              <a:t>給我一顆受教的靈</a:t>
+            </a:r>
+            <a:endParaRPr lang="en-US" altLang="zh-TW" sz="6400" b="1" dirty="0">
               <a:solidFill>
                 <a:srgbClr val="000066"/>
               </a:solidFill>
@@ -3388,21 +3242,136 @@
               <a:ea typeface="微軟正黑體" pitchFamily="34" charset="-120"/>
             </a:endParaRPr>
           </a:p>
+        </p:txBody>
+      </p:sp>
+      <p:sp>
+        <p:nvSpPr>
+          <p:cNvPr id="3" name="TextBox 2"/>
+          <p:cNvSpPr txBox="1"/>
+          <p:nvPr/>
+        </p:nvSpPr>
+        <p:spPr>
+          <a:xfrm>
+            <a:off x="0" y="5157192"/>
+            <a:ext cx="12192000" cy="666786"/>
+          </a:xfrm>
+          <a:prstGeom prst="rect">
+            <a:avLst/>
+          </a:prstGeom>
+          <a:noFill/>
+        </p:spPr>
+        <p:txBody>
+          <a:bodyPr wrap="square" rtlCol="0">
+            <a:spAutoFit/>
+          </a:bodyPr>
+          <a:lstStyle/>
+          <a:p>
+            <a:pPr algn="ctr"/>
+            <a:r>
+              <a:rPr lang="en-US" sz="3733" b="1" dirty="0">
+                <a:solidFill>
+                  <a:srgbClr val="000066"/>
+                </a:solidFill>
+                <a:latin typeface="Microsoft JhengHei" panose="020B0604030504040204" pitchFamily="34" charset="-120"/>
+                <a:ea typeface="Microsoft JhengHei" panose="020B0604030504040204" pitchFamily="34" charset="-120"/>
+              </a:rPr>
+              <a:t>( </a:t>
+            </a:r>
+            <a:r>
+              <a:rPr lang="zh-CN" altLang="en-US" sz="3733" b="1" dirty="0">
+                <a:solidFill>
+                  <a:srgbClr val="000066"/>
+                </a:solidFill>
+                <a:latin typeface="Microsoft JhengHei" panose="020B0604030504040204" pitchFamily="34" charset="-120"/>
+                <a:ea typeface="Microsoft JhengHei" panose="020B0604030504040204" pitchFamily="34" charset="-120"/>
+              </a:rPr>
+              <a:t>正</a:t>
+            </a:r>
+            <a:r>
+              <a:rPr lang="en-US" sz="3733" b="1" dirty="0">
+                <a:solidFill>
+                  <a:srgbClr val="000066"/>
+                </a:solidFill>
+                <a:latin typeface="Microsoft JhengHei" panose="020B0604030504040204" pitchFamily="34" charset="-120"/>
+                <a:ea typeface="Microsoft JhengHei" panose="020B0604030504040204" pitchFamily="34" charset="-120"/>
+              </a:rPr>
+              <a:t> )</a:t>
+            </a:r>
+            <a:endParaRPr lang="vi-VN" sz="3733" b="1" dirty="0">
+              <a:solidFill>
+                <a:srgbClr val="000066"/>
+              </a:solidFill>
+              <a:ea typeface="Microsoft JhengHei" panose="020B0604030504040204" pitchFamily="34" charset="-120"/>
+            </a:endParaRPr>
+          </a:p>
+        </p:txBody>
+      </p:sp>
+    </p:spTree>
+    <p:extLst>
+      <p:ext uri="{BB962C8B-B14F-4D97-AF65-F5344CB8AC3E}">
+        <p14:creationId xmlns:p14="http://schemas.microsoft.com/office/powerpoint/2010/main" val="2221790004"/>
+      </p:ext>
+    </p:extLst>
+  </p:cSld>
+  <p:clrMapOvr>
+    <a:masterClrMapping/>
+  </p:clrMapOvr>
+</p:sld>
+</file>
+
+<file path=ppt/slides/slide3.xml><?xml version="1.0" encoding="utf-8"?>
+<p:sld xmlns:a="http://schemas.openxmlformats.org/drawingml/2006/main" xmlns:r="http://schemas.openxmlformats.org/officeDocument/2006/relationships" xmlns:p="http://schemas.openxmlformats.org/presentationml/2006/main">
+  <p:cSld>
+    <p:spTree>
+      <p:nvGrpSpPr>
+        <p:cNvPr id="1" name=""/>
+        <p:cNvGrpSpPr/>
+        <p:nvPr/>
+      </p:nvGrpSpPr>
+      <p:grpSpPr>
+        <a:xfrm>
+          <a:off x="0" y="0"/>
+          <a:ext cx="0" cy="0"/>
+          <a:chOff x="0" y="0"/>
+          <a:chExt cx="0" cy="0"/>
+        </a:xfrm>
+      </p:grpSpPr>
+      <p:sp>
+        <p:nvSpPr>
+          <p:cNvPr id="5" name="內容版面配置區 4"/>
+          <p:cNvSpPr>
+            <a:spLocks noGrp="1"/>
+          </p:cNvSpPr>
+          <p:nvPr>
+            <p:ph idx="1"/>
+          </p:nvPr>
+        </p:nvSpPr>
+        <p:spPr>
+          <a:xfrm>
+            <a:off x="0" y="2084851"/>
+            <a:ext cx="12192000" cy="2404863"/>
+          </a:xfrm>
+        </p:spPr>
+        <p:txBody>
+          <a:bodyPr anchor="ctr">
+            <a:normAutofit/>
+          </a:bodyPr>
+          <a:lstStyle/>
           <a:p>
             <a:pPr algn="ctr">
               <a:buNone/>
             </a:pPr>
             <a:r>
-              <a:rPr lang="zh-TW" altLang="en-US" sz="5400" b="1" dirty="0" smtClean="0">
+              <a:rPr lang="zh-TW" altLang="en-US" sz="6400" b="1" dirty="0">
                 <a:solidFill>
                   <a:srgbClr val="000066"/>
                 </a:solidFill>
                 <a:latin typeface="微軟正黑體" pitchFamily="34" charset="-120"/>
                 <a:ea typeface="微軟正黑體" pitchFamily="34" charset="-120"/>
               </a:rPr>
-              <a:t>幫助我更深的倚靠</a:t>
-            </a:r>
-            <a:endParaRPr lang="en-US" altLang="zh-TW" sz="5400" b="1" dirty="0" smtClean="0">
+              <a:t>好讓我能走在祢的旨意裡</a:t>
+            </a:r>
+            <a:endParaRPr lang="en-US" altLang="zh-TW" sz="6400" b="1" dirty="0">
               <a:solidFill>
                 <a:srgbClr val="000066"/>
               </a:solidFill>
@@ -3415,16 +3384,16 @@
               <a:buNone/>
             </a:pPr>
             <a:r>
-              <a:rPr lang="zh-TW" altLang="en-US" sz="5400" b="1" dirty="0" smtClean="0">
+              <a:rPr lang="zh-TW" altLang="en-US" sz="6400" b="1" dirty="0">
                 <a:solidFill>
                   <a:srgbClr val="000066"/>
                 </a:solidFill>
                 <a:latin typeface="微軟正黑體" pitchFamily="34" charset="-120"/>
                 <a:ea typeface="微軟正黑體" pitchFamily="34" charset="-120"/>
               </a:rPr>
-              <a:t>單單相信你  深深敬畏你</a:t>
-            </a:r>
-            <a:endParaRPr lang="en-US" altLang="zh-TW" sz="5400" b="1" dirty="0" smtClean="0">
+              <a:t>如同耶穌的生命</a:t>
+            </a:r>
+            <a:endParaRPr lang="en-US" altLang="zh-TW" sz="6400" b="1" dirty="0">
               <a:solidFill>
                 <a:srgbClr val="000066"/>
               </a:solidFill>
@@ -3432,21 +3401,136 @@
               <a:ea typeface="微軟正黑體" pitchFamily="34" charset="-120"/>
             </a:endParaRPr>
           </a:p>
+        </p:txBody>
+      </p:sp>
+      <p:sp>
+        <p:nvSpPr>
+          <p:cNvPr id="3" name="TextBox 2"/>
+          <p:cNvSpPr txBox="1"/>
+          <p:nvPr/>
+        </p:nvSpPr>
+        <p:spPr>
+          <a:xfrm>
+            <a:off x="0" y="5157192"/>
+            <a:ext cx="12192000" cy="666786"/>
+          </a:xfrm>
+          <a:prstGeom prst="rect">
+            <a:avLst/>
+          </a:prstGeom>
+          <a:noFill/>
+        </p:spPr>
+        <p:txBody>
+          <a:bodyPr wrap="square" rtlCol="0">
+            <a:spAutoFit/>
+          </a:bodyPr>
+          <a:lstStyle/>
+          <a:p>
+            <a:pPr algn="ctr"/>
+            <a:r>
+              <a:rPr lang="en-US" sz="3733" b="1" dirty="0">
+                <a:solidFill>
+                  <a:srgbClr val="000066"/>
+                </a:solidFill>
+                <a:latin typeface="Microsoft JhengHei" panose="020B0604030504040204" pitchFamily="34" charset="-120"/>
+                <a:ea typeface="Microsoft JhengHei" panose="020B0604030504040204" pitchFamily="34" charset="-120"/>
+              </a:rPr>
+              <a:t>( </a:t>
+            </a:r>
+            <a:r>
+              <a:rPr lang="zh-CN" altLang="en-US" sz="3733" b="1" dirty="0">
+                <a:solidFill>
+                  <a:srgbClr val="000066"/>
+                </a:solidFill>
+                <a:latin typeface="Microsoft JhengHei" panose="020B0604030504040204" pitchFamily="34" charset="-120"/>
+                <a:ea typeface="Microsoft JhengHei" panose="020B0604030504040204" pitchFamily="34" charset="-120"/>
+              </a:rPr>
+              <a:t>正</a:t>
+            </a:r>
+            <a:r>
+              <a:rPr lang="en-US" sz="3733" b="1" dirty="0">
+                <a:solidFill>
+                  <a:srgbClr val="000066"/>
+                </a:solidFill>
+                <a:latin typeface="Microsoft JhengHei" panose="020B0604030504040204" pitchFamily="34" charset="-120"/>
+                <a:ea typeface="Microsoft JhengHei" panose="020B0604030504040204" pitchFamily="34" charset="-120"/>
+              </a:rPr>
+              <a:t> )</a:t>
+            </a:r>
+            <a:endParaRPr lang="vi-VN" sz="3733" b="1" dirty="0">
+              <a:solidFill>
+                <a:srgbClr val="000066"/>
+              </a:solidFill>
+              <a:ea typeface="Microsoft JhengHei" panose="020B0604030504040204" pitchFamily="34" charset="-120"/>
+            </a:endParaRPr>
+          </a:p>
+        </p:txBody>
+      </p:sp>
+    </p:spTree>
+    <p:extLst>
+      <p:ext uri="{BB962C8B-B14F-4D97-AF65-F5344CB8AC3E}">
+        <p14:creationId xmlns:p14="http://schemas.microsoft.com/office/powerpoint/2010/main" val="3280116231"/>
+      </p:ext>
+    </p:extLst>
+  </p:cSld>
+  <p:clrMapOvr>
+    <a:masterClrMapping/>
+  </p:clrMapOvr>
+</p:sld>
+</file>
+
+<file path=ppt/slides/slide4.xml><?xml version="1.0" encoding="utf-8"?>
+<p:sld xmlns:a="http://schemas.openxmlformats.org/drawingml/2006/main" xmlns:r="http://schemas.openxmlformats.org/officeDocument/2006/relationships" xmlns:p="http://schemas.openxmlformats.org/presentationml/2006/main">
+  <p:cSld>
+    <p:spTree>
+      <p:nvGrpSpPr>
+        <p:cNvPr id="1" name=""/>
+        <p:cNvGrpSpPr/>
+        <p:nvPr/>
+      </p:nvGrpSpPr>
+      <p:grpSpPr>
+        <a:xfrm>
+          <a:off x="0" y="0"/>
+          <a:ext cx="0" cy="0"/>
+          <a:chOff x="0" y="0"/>
+          <a:chExt cx="0" cy="0"/>
+        </a:xfrm>
+      </p:grpSpPr>
+      <p:sp>
+        <p:nvSpPr>
+          <p:cNvPr id="5" name="內容版面配置區 4"/>
+          <p:cNvSpPr>
+            <a:spLocks noGrp="1"/>
+          </p:cNvSpPr>
+          <p:nvPr>
+            <p:ph idx="1"/>
+          </p:nvPr>
+        </p:nvSpPr>
+        <p:spPr>
+          <a:xfrm>
+            <a:off x="0" y="2084851"/>
+            <a:ext cx="12192000" cy="2404863"/>
+          </a:xfrm>
+        </p:spPr>
+        <p:txBody>
+          <a:bodyPr anchor="ctr">
+            <a:normAutofit/>
+          </a:bodyPr>
+          <a:lstStyle/>
           <a:p>
             <a:pPr algn="ctr">
               <a:buNone/>
             </a:pPr>
             <a:r>
-              <a:rPr lang="zh-TW" altLang="en-US" sz="5400" b="1" dirty="0" smtClean="0">
+              <a:rPr lang="zh-TW" altLang="en-US" sz="6400" b="1" dirty="0">
                 <a:solidFill>
                   <a:srgbClr val="000066"/>
                 </a:solidFill>
                 <a:latin typeface="微軟正黑體" pitchFamily="34" charset="-120"/>
                 <a:ea typeface="微軟正黑體" pitchFamily="34" charset="-120"/>
               </a:rPr>
-              <a:t>一生要跟隨你</a:t>
-            </a:r>
-            <a:endParaRPr lang="zh-TW" altLang="en-US" sz="5400" b="1" dirty="0">
+              <a:t>幫助我更多的禱告</a:t>
+            </a:r>
+            <a:endParaRPr lang="en-US" altLang="zh-TW" sz="6400" b="1" dirty="0">
               <a:solidFill>
                 <a:srgbClr val="000066"/>
               </a:solidFill>
@@ -3454,9 +3538,257 @@
               <a:ea typeface="微軟正黑體" pitchFamily="34" charset="-120"/>
             </a:endParaRPr>
           </a:p>
+          <a:p>
+            <a:pPr algn="ctr">
+              <a:buNone/>
+            </a:pPr>
+            <a:r>
+              <a:rPr lang="zh-TW" altLang="en-US" sz="6400" b="1" dirty="0">
+                <a:solidFill>
+                  <a:srgbClr val="000066"/>
+                </a:solidFill>
+                <a:latin typeface="微軟正黑體" pitchFamily="34" charset="-120"/>
+                <a:ea typeface="微軟正黑體" pitchFamily="34" charset="-120"/>
+              </a:rPr>
+              <a:t>幫助我更深的倚靠</a:t>
+            </a:r>
+            <a:endParaRPr lang="en-US" altLang="zh-TW" sz="6400" b="1" dirty="0">
+              <a:solidFill>
+                <a:srgbClr val="000066"/>
+              </a:solidFill>
+              <a:latin typeface="微軟正黑體" pitchFamily="34" charset="-120"/>
+              <a:ea typeface="微軟正黑體" pitchFamily="34" charset="-120"/>
+            </a:endParaRPr>
+          </a:p>
+        </p:txBody>
+      </p:sp>
+      <p:sp>
+        <p:nvSpPr>
+          <p:cNvPr id="3" name="TextBox 2"/>
+          <p:cNvSpPr txBox="1"/>
+          <p:nvPr/>
+        </p:nvSpPr>
+        <p:spPr>
+          <a:xfrm>
+            <a:off x="0" y="5157192"/>
+            <a:ext cx="12192000" cy="666786"/>
+          </a:xfrm>
+          <a:prstGeom prst="rect">
+            <a:avLst/>
+          </a:prstGeom>
+          <a:noFill/>
+        </p:spPr>
+        <p:txBody>
+          <a:bodyPr wrap="square" rtlCol="0">
+            <a:spAutoFit/>
+          </a:bodyPr>
+          <a:lstStyle/>
+          <a:p>
+            <a:pPr algn="ctr"/>
+            <a:r>
+              <a:rPr lang="en-US" sz="3733" b="1" dirty="0">
+                <a:solidFill>
+                  <a:srgbClr val="000066"/>
+                </a:solidFill>
+                <a:latin typeface="Microsoft JhengHei" panose="020B0604030504040204" pitchFamily="34" charset="-120"/>
+                <a:ea typeface="Microsoft JhengHei" panose="020B0604030504040204" pitchFamily="34" charset="-120"/>
+              </a:rPr>
+              <a:t>( </a:t>
+            </a:r>
+            <a:r>
+              <a:rPr lang="zh-CN" altLang="en-US" sz="3733" b="1" dirty="0">
+                <a:solidFill>
+                  <a:srgbClr val="000066"/>
+                </a:solidFill>
+                <a:latin typeface="Microsoft JhengHei" panose="020B0604030504040204" pitchFamily="34" charset="-120"/>
+                <a:ea typeface="Microsoft JhengHei" panose="020B0604030504040204" pitchFamily="34" charset="-120"/>
+              </a:rPr>
+              <a:t>副</a:t>
+            </a:r>
+            <a:r>
+              <a:rPr lang="en-US" sz="3733" b="1" dirty="0">
+                <a:solidFill>
+                  <a:srgbClr val="000066"/>
+                </a:solidFill>
+                <a:latin typeface="Microsoft JhengHei" panose="020B0604030504040204" pitchFamily="34" charset="-120"/>
+                <a:ea typeface="Microsoft JhengHei" panose="020B0604030504040204" pitchFamily="34" charset="-120"/>
+              </a:rPr>
+              <a:t> )</a:t>
+            </a:r>
+            <a:endParaRPr lang="vi-VN" sz="3733" b="1" dirty="0">
+              <a:solidFill>
+                <a:srgbClr val="000066"/>
+              </a:solidFill>
+              <a:ea typeface="Microsoft JhengHei" panose="020B0604030504040204" pitchFamily="34" charset="-120"/>
+            </a:endParaRPr>
+          </a:p>
         </p:txBody>
       </p:sp>
     </p:spTree>
+    <p:extLst>
+      <p:ext uri="{BB962C8B-B14F-4D97-AF65-F5344CB8AC3E}">
+        <p14:creationId xmlns:p14="http://schemas.microsoft.com/office/powerpoint/2010/main" val="2638220697"/>
+      </p:ext>
+    </p:extLst>
+  </p:cSld>
+  <p:clrMapOvr>
+    <a:masterClrMapping/>
+  </p:clrMapOvr>
+</p:sld>
+</file>
+
+<file path=ppt/slides/slide5.xml><?xml version="1.0" encoding="utf-8"?>
+<p:sld xmlns:a="http://schemas.openxmlformats.org/drawingml/2006/main" xmlns:r="http://schemas.openxmlformats.org/officeDocument/2006/relationships" xmlns:p="http://schemas.openxmlformats.org/presentationml/2006/main">
+  <p:cSld>
+    <p:spTree>
+      <p:nvGrpSpPr>
+        <p:cNvPr id="1" name=""/>
+        <p:cNvGrpSpPr/>
+        <p:nvPr/>
+      </p:nvGrpSpPr>
+      <p:grpSpPr>
+        <a:xfrm>
+          <a:off x="0" y="0"/>
+          <a:ext cx="0" cy="0"/>
+          <a:chOff x="0" y="0"/>
+          <a:chExt cx="0" cy="0"/>
+        </a:xfrm>
+      </p:grpSpPr>
+      <p:sp>
+        <p:nvSpPr>
+          <p:cNvPr id="5" name="內容版面配置區 4"/>
+          <p:cNvSpPr>
+            <a:spLocks noGrp="1"/>
+          </p:cNvSpPr>
+          <p:nvPr>
+            <p:ph idx="1"/>
+          </p:nvPr>
+        </p:nvSpPr>
+        <p:spPr>
+          <a:xfrm>
+            <a:off x="0" y="2084851"/>
+            <a:ext cx="12192000" cy="2404863"/>
+          </a:xfrm>
+        </p:spPr>
+        <p:txBody>
+          <a:bodyPr anchor="ctr">
+            <a:normAutofit/>
+          </a:bodyPr>
+          <a:lstStyle/>
+          <a:p>
+            <a:pPr algn="ctr">
+              <a:buNone/>
+            </a:pPr>
+            <a:r>
+              <a:rPr lang="zh-TW" altLang="en-US" sz="6400" b="1" dirty="0">
+                <a:solidFill>
+                  <a:srgbClr val="000066"/>
+                </a:solidFill>
+                <a:latin typeface="微軟正黑體" pitchFamily="34" charset="-120"/>
+                <a:ea typeface="微軟正黑體" pitchFamily="34" charset="-120"/>
+              </a:rPr>
+              <a:t>單單相信祢  深深敬畏祢</a:t>
+            </a:r>
+            <a:endParaRPr lang="en-US" altLang="zh-TW" sz="6400" b="1" dirty="0">
+              <a:solidFill>
+                <a:srgbClr val="000066"/>
+              </a:solidFill>
+              <a:latin typeface="微軟正黑體" pitchFamily="34" charset="-120"/>
+              <a:ea typeface="微軟正黑體" pitchFamily="34" charset="-120"/>
+            </a:endParaRPr>
+          </a:p>
+          <a:p>
+            <a:pPr algn="ctr">
+              <a:buNone/>
+            </a:pPr>
+            <a:r>
+              <a:rPr lang="zh-TW" altLang="en-US" sz="6400" b="1" dirty="0">
+                <a:solidFill>
+                  <a:srgbClr val="000066"/>
+                </a:solidFill>
+                <a:latin typeface="微軟正黑體" pitchFamily="34" charset="-120"/>
+                <a:ea typeface="微軟正黑體" pitchFamily="34" charset="-120"/>
+              </a:rPr>
+              <a:t>一生要跟隨祢</a:t>
+            </a:r>
+            <a:endParaRPr lang="zh-TW" altLang="en-US" sz="6400" b="1" dirty="0">
+              <a:solidFill>
+                <a:srgbClr val="000066"/>
+              </a:solidFill>
+              <a:latin typeface="微軟正黑體" pitchFamily="34" charset="-120"/>
+              <a:ea typeface="微軟正黑體" pitchFamily="34" charset="-120"/>
+            </a:endParaRPr>
+          </a:p>
+        </p:txBody>
+      </p:sp>
+      <p:sp>
+        <p:nvSpPr>
+          <p:cNvPr id="3" name="TextBox 2"/>
+          <p:cNvSpPr txBox="1"/>
+          <p:nvPr/>
+        </p:nvSpPr>
+        <p:spPr>
+          <a:xfrm>
+            <a:off x="0" y="5157192"/>
+            <a:ext cx="12192000" cy="666786"/>
+          </a:xfrm>
+          <a:prstGeom prst="rect">
+            <a:avLst/>
+          </a:prstGeom>
+          <a:noFill/>
+        </p:spPr>
+        <p:txBody>
+          <a:bodyPr wrap="square" rtlCol="0">
+            <a:spAutoFit/>
+          </a:bodyPr>
+          <a:lstStyle/>
+          <a:p>
+            <a:pPr algn="ctr"/>
+            <a:r>
+              <a:rPr lang="en-US" sz="3733" b="1" dirty="0">
+                <a:solidFill>
+                  <a:srgbClr val="000066"/>
+                </a:solidFill>
+                <a:latin typeface="Microsoft JhengHei" panose="020B0604030504040204" pitchFamily="34" charset="-120"/>
+                <a:ea typeface="Microsoft JhengHei" panose="020B0604030504040204" pitchFamily="34" charset="-120"/>
+              </a:rPr>
+              <a:t>( </a:t>
+            </a:r>
+            <a:r>
+              <a:rPr lang="zh-CN" altLang="en-US" sz="3733" b="1" dirty="0">
+                <a:solidFill>
+                  <a:srgbClr val="000066"/>
+                </a:solidFill>
+                <a:latin typeface="Microsoft JhengHei" panose="020B0604030504040204" pitchFamily="34" charset="-120"/>
+                <a:ea typeface="Microsoft JhengHei" panose="020B0604030504040204" pitchFamily="34" charset="-120"/>
+              </a:rPr>
+              <a:t>副</a:t>
+            </a:r>
+            <a:r>
+              <a:rPr lang="en-US" sz="3733" b="1" dirty="0">
+                <a:solidFill>
+                  <a:srgbClr val="000066"/>
+                </a:solidFill>
+                <a:latin typeface="Microsoft JhengHei" panose="020B0604030504040204" pitchFamily="34" charset="-120"/>
+                <a:ea typeface="Microsoft JhengHei" panose="020B0604030504040204" pitchFamily="34" charset="-120"/>
+              </a:rPr>
+              <a:t> )</a:t>
+            </a:r>
+            <a:endParaRPr lang="vi-VN" sz="3733" b="1" dirty="0">
+              <a:solidFill>
+                <a:srgbClr val="000066"/>
+              </a:solidFill>
+              <a:ea typeface="Microsoft JhengHei" panose="020B0604030504040204" pitchFamily="34" charset="-120"/>
+            </a:endParaRPr>
+          </a:p>
+        </p:txBody>
+      </p:sp>
+    </p:spTree>
+    <p:extLst>
+      <p:ext uri="{BB962C8B-B14F-4D97-AF65-F5344CB8AC3E}">
+        <p14:creationId xmlns:p14="http://schemas.microsoft.com/office/powerpoint/2010/main" val="2322494670"/>
+      </p:ext>
+    </p:extLst>
   </p:cSld>
   <p:clrMapOvr>
     <a:masterClrMapping/>

</xml_diff>